<commit_message>
@seon review: review buffer mode selection
</commit_message>
<xml_diff>
--- a/PlatformDeveloperGuide/images/display_modes_nocustom.pptx
+++ b/PlatformDeveloperGuide/images/display_modes_nocustom.pptx
@@ -104,6 +104,11 @@
       </a:defRPr>
     </a:lvl9pPr>
   </p:defaultTextStyle>
+  <p:extLst>
+    <p:ext uri="{EFAFB233-063F-42B5-8137-9DF3F51BA10A}">
+      <p15:sldGuideLst xmlns:p15="http://schemas.microsoft.com/office/powerpoint/2012/main"/>
+    </p:ext>
+  </p:extLst>
 </p:presentation>
 </file>
 
@@ -238,7 +243,7 @@
           <a:p>
             <a:fld id="{B0B69CF3-5B14-48D7-B161-C10A5429FF4B}" type="datetimeFigureOut">
               <a:rPr lang="en-US" smtClean="0"/>
-              <a:t>20/12/07</a:t>
+              <a:t>20/12/08</a:t>
             </a:fld>
             <a:endParaRPr lang="en-US"/>
           </a:p>
@@ -408,7 +413,7 @@
           <a:p>
             <a:fld id="{B0B69CF3-5B14-48D7-B161-C10A5429FF4B}" type="datetimeFigureOut">
               <a:rPr lang="en-US" smtClean="0"/>
-              <a:t>20/12/07</a:t>
+              <a:t>20/12/08</a:t>
             </a:fld>
             <a:endParaRPr lang="en-US"/>
           </a:p>
@@ -588,7 +593,7 @@
           <a:p>
             <a:fld id="{B0B69CF3-5B14-48D7-B161-C10A5429FF4B}" type="datetimeFigureOut">
               <a:rPr lang="en-US" smtClean="0"/>
-              <a:t>20/12/07</a:t>
+              <a:t>20/12/08</a:t>
             </a:fld>
             <a:endParaRPr lang="en-US"/>
           </a:p>
@@ -758,7 +763,7 @@
           <a:p>
             <a:fld id="{B0B69CF3-5B14-48D7-B161-C10A5429FF4B}" type="datetimeFigureOut">
               <a:rPr lang="en-US" smtClean="0"/>
-              <a:t>20/12/07</a:t>
+              <a:t>20/12/08</a:t>
             </a:fld>
             <a:endParaRPr lang="en-US"/>
           </a:p>
@@ -1002,7 +1007,7 @@
           <a:p>
             <a:fld id="{B0B69CF3-5B14-48D7-B161-C10A5429FF4B}" type="datetimeFigureOut">
               <a:rPr lang="en-US" smtClean="0"/>
-              <a:t>20/12/07</a:t>
+              <a:t>20/12/08</a:t>
             </a:fld>
             <a:endParaRPr lang="en-US"/>
           </a:p>
@@ -1234,7 +1239,7 @@
           <a:p>
             <a:fld id="{B0B69CF3-5B14-48D7-B161-C10A5429FF4B}" type="datetimeFigureOut">
               <a:rPr lang="en-US" smtClean="0"/>
-              <a:t>20/12/07</a:t>
+              <a:t>20/12/08</a:t>
             </a:fld>
             <a:endParaRPr lang="en-US"/>
           </a:p>
@@ -1601,7 +1606,7 @@
           <a:p>
             <a:fld id="{B0B69CF3-5B14-48D7-B161-C10A5429FF4B}" type="datetimeFigureOut">
               <a:rPr lang="en-US" smtClean="0"/>
-              <a:t>20/12/07</a:t>
+              <a:t>20/12/08</a:t>
             </a:fld>
             <a:endParaRPr lang="en-US"/>
           </a:p>
@@ -1719,7 +1724,7 @@
           <a:p>
             <a:fld id="{B0B69CF3-5B14-48D7-B161-C10A5429FF4B}" type="datetimeFigureOut">
               <a:rPr lang="en-US" smtClean="0"/>
-              <a:t>20/12/07</a:t>
+              <a:t>20/12/08</a:t>
             </a:fld>
             <a:endParaRPr lang="en-US"/>
           </a:p>
@@ -1814,7 +1819,7 @@
           <a:p>
             <a:fld id="{B0B69CF3-5B14-48D7-B161-C10A5429FF4B}" type="datetimeFigureOut">
               <a:rPr lang="en-US" smtClean="0"/>
-              <a:t>20/12/07</a:t>
+              <a:t>20/12/08</a:t>
             </a:fld>
             <a:endParaRPr lang="en-US"/>
           </a:p>
@@ -2091,7 +2096,7 @@
           <a:p>
             <a:fld id="{B0B69CF3-5B14-48D7-B161-C10A5429FF4B}" type="datetimeFigureOut">
               <a:rPr lang="en-US" smtClean="0"/>
-              <a:t>20/12/07</a:t>
+              <a:t>20/12/08</a:t>
             </a:fld>
             <a:endParaRPr lang="en-US"/>
           </a:p>
@@ -2348,7 +2353,7 @@
           <a:p>
             <a:fld id="{B0B69CF3-5B14-48D7-B161-C10A5429FF4B}" type="datetimeFigureOut">
               <a:rPr lang="en-US" smtClean="0"/>
-              <a:t>20/12/07</a:t>
+              <a:t>20/12/08</a:t>
             </a:fld>
             <a:endParaRPr lang="en-US"/>
           </a:p>
@@ -2561,7 +2566,7 @@
           <a:p>
             <a:fld id="{B0B69CF3-5B14-48D7-B161-C10A5429FF4B}" type="datetimeFigureOut">
               <a:rPr lang="en-US" smtClean="0"/>
-              <a:t>20/12/07</a:t>
+              <a:t>20/12/08</a:t>
             </a:fld>
             <a:endParaRPr lang="en-US"/>
           </a:p>
@@ -4363,6 +4368,183 @@
           </a:p>
         </p:txBody>
       </p:sp>
+      <p:sp>
+        <p:nvSpPr>
+          <p:cNvPr id="31" name="Rectangle 30">
+            <a:extLst>
+              <a:ext uri="{FF2B5EF4-FFF2-40B4-BE49-F238E27FC236}">
+                <a16:creationId xmlns:a16="http://schemas.microsoft.com/office/drawing/2014/main" id="{B83BB1A9-994B-4E22-B01A-C3EBEEBC40BD}"/>
+              </a:ext>
+            </a:extLst>
+          </p:cNvPr>
+          <p:cNvSpPr/>
+          <p:nvPr/>
+        </p:nvSpPr>
+        <p:spPr>
+          <a:xfrm>
+            <a:off x="6876660" y="14292563"/>
+            <a:ext cx="2267339" cy="288660"/>
+          </a:xfrm>
+          <a:prstGeom prst="rect">
+            <a:avLst/>
+          </a:prstGeom>
+          <a:solidFill>
+            <a:schemeClr val="bg1"/>
+          </a:solidFill>
+          <a:ln>
+            <a:noFill/>
+          </a:ln>
+        </p:spPr>
+        <p:style>
+          <a:lnRef idx="2">
+            <a:schemeClr val="accent1">
+              <a:shade val="50000"/>
+            </a:schemeClr>
+          </a:lnRef>
+          <a:fillRef idx="1">
+            <a:schemeClr val="accent1"/>
+          </a:fillRef>
+          <a:effectRef idx="0">
+            <a:schemeClr val="accent1"/>
+          </a:effectRef>
+          <a:fontRef idx="minor">
+            <a:schemeClr val="lt1"/>
+          </a:fontRef>
+        </p:style>
+        <p:txBody>
+          <a:bodyPr rtlCol="0" anchor="ctr"/>
+          <a:lstStyle/>
+          <a:p>
+            <a:pPr algn="ctr"/>
+            <a:r>
+              <a:rPr lang="en-US" sz="2400" dirty="0">
+                <a:solidFill>
+                  <a:schemeClr val="tx1"/>
+                </a:solidFill>
+              </a:rPr>
+              <a:t>2 buffers in RAM</a:t>
+            </a:r>
+          </a:p>
+        </p:txBody>
+      </p:sp>
+      <p:sp>
+        <p:nvSpPr>
+          <p:cNvPr id="33" name="Rectangle 32">
+            <a:extLst>
+              <a:ext uri="{FF2B5EF4-FFF2-40B4-BE49-F238E27FC236}">
+                <a16:creationId xmlns:a16="http://schemas.microsoft.com/office/drawing/2014/main" id="{EA6A4019-E872-4CBE-B9CC-BB4E0F63E5DA}"/>
+              </a:ext>
+            </a:extLst>
+          </p:cNvPr>
+          <p:cNvSpPr/>
+          <p:nvPr/>
+        </p:nvSpPr>
+        <p:spPr>
+          <a:xfrm>
+            <a:off x="9947785" y="14324115"/>
+            <a:ext cx="2267339" cy="288660"/>
+          </a:xfrm>
+          <a:prstGeom prst="rect">
+            <a:avLst/>
+          </a:prstGeom>
+          <a:solidFill>
+            <a:schemeClr val="bg1"/>
+          </a:solidFill>
+          <a:ln>
+            <a:noFill/>
+          </a:ln>
+        </p:spPr>
+        <p:style>
+          <a:lnRef idx="2">
+            <a:schemeClr val="accent1">
+              <a:shade val="50000"/>
+            </a:schemeClr>
+          </a:lnRef>
+          <a:fillRef idx="1">
+            <a:schemeClr val="accent1"/>
+          </a:fillRef>
+          <a:effectRef idx="0">
+            <a:schemeClr val="accent1"/>
+          </a:effectRef>
+          <a:fontRef idx="minor">
+            <a:schemeClr val="lt1"/>
+          </a:fontRef>
+        </p:style>
+        <p:txBody>
+          <a:bodyPr rtlCol="0" anchor="ctr"/>
+          <a:lstStyle/>
+          <a:p>
+            <a:pPr algn="ctr"/>
+            <a:r>
+              <a:rPr lang="en-US" sz="2400" dirty="0">
+                <a:solidFill>
+                  <a:schemeClr val="tx1"/>
+                </a:solidFill>
+              </a:rPr>
+              <a:t>1 buffer in RAM</a:t>
+            </a:r>
+          </a:p>
+        </p:txBody>
+      </p:sp>
+      <p:sp>
+        <p:nvSpPr>
+          <p:cNvPr id="34" name="Rectangle 33">
+            <a:extLst>
+              <a:ext uri="{FF2B5EF4-FFF2-40B4-BE49-F238E27FC236}">
+                <a16:creationId xmlns:a16="http://schemas.microsoft.com/office/drawing/2014/main" id="{FA9E4A11-BA94-43E6-B70B-98FD11F65094}"/>
+              </a:ext>
+            </a:extLst>
+          </p:cNvPr>
+          <p:cNvSpPr/>
+          <p:nvPr/>
+        </p:nvSpPr>
+        <p:spPr>
+          <a:xfrm>
+            <a:off x="12965833" y="14324115"/>
+            <a:ext cx="2373491" cy="288660"/>
+          </a:xfrm>
+          <a:prstGeom prst="rect">
+            <a:avLst/>
+          </a:prstGeom>
+          <a:solidFill>
+            <a:schemeClr val="bg1"/>
+          </a:solidFill>
+          <a:ln>
+            <a:noFill/>
+          </a:ln>
+        </p:spPr>
+        <p:style>
+          <a:lnRef idx="2">
+            <a:schemeClr val="accent1">
+              <a:shade val="50000"/>
+            </a:schemeClr>
+          </a:lnRef>
+          <a:fillRef idx="1">
+            <a:schemeClr val="accent1"/>
+          </a:fillRef>
+          <a:effectRef idx="0">
+            <a:schemeClr val="accent1"/>
+          </a:effectRef>
+          <a:fontRef idx="minor">
+            <a:schemeClr val="lt1"/>
+          </a:fontRef>
+        </p:style>
+        <p:txBody>
+          <a:bodyPr rtlCol="0" anchor="ctr"/>
+          <a:lstStyle/>
+          <a:p>
+            <a:pPr algn="ctr"/>
+            <a:r>
+              <a:rPr lang="en-US" sz="2400" dirty="0">
+                <a:solidFill>
+                  <a:schemeClr val="tx1"/>
+                </a:solidFill>
+              </a:rPr>
+              <a:t>no buffer in RAM</a:t>
+            </a:r>
+          </a:p>
+        </p:txBody>
+      </p:sp>
     </p:spTree>
     <p:extLst>
       <p:ext uri="{BB962C8B-B14F-4D97-AF65-F5344CB8AC3E}">

</xml_diff>

<commit_message>
J0190UIL-1144 Update buffer modes diagram
</commit_message>
<xml_diff>
--- a/PlatformDeveloperGuide/images/display_modes_nocustom.pptx
+++ b/PlatformDeveloperGuide/images/display_modes_nocustom.pptx
@@ -243,7 +243,7 @@
           <a:p>
             <a:fld id="{B0B69CF3-5B14-48D7-B161-C10A5429FF4B}" type="datetimeFigureOut">
               <a:rPr lang="en-US" smtClean="0"/>
-              <a:t>20/12/08</a:t>
+              <a:t>10-Dec-20</a:t>
             </a:fld>
             <a:endParaRPr lang="en-US"/>
           </a:p>
@@ -413,7 +413,7 @@
           <a:p>
             <a:fld id="{B0B69CF3-5B14-48D7-B161-C10A5429FF4B}" type="datetimeFigureOut">
               <a:rPr lang="en-US" smtClean="0"/>
-              <a:t>20/12/08</a:t>
+              <a:t>10-Dec-20</a:t>
             </a:fld>
             <a:endParaRPr lang="en-US"/>
           </a:p>
@@ -593,7 +593,7 @@
           <a:p>
             <a:fld id="{B0B69CF3-5B14-48D7-B161-C10A5429FF4B}" type="datetimeFigureOut">
               <a:rPr lang="en-US" smtClean="0"/>
-              <a:t>20/12/08</a:t>
+              <a:t>10-Dec-20</a:t>
             </a:fld>
             <a:endParaRPr lang="en-US"/>
           </a:p>
@@ -763,7 +763,7 @@
           <a:p>
             <a:fld id="{B0B69CF3-5B14-48D7-B161-C10A5429FF4B}" type="datetimeFigureOut">
               <a:rPr lang="en-US" smtClean="0"/>
-              <a:t>20/12/08</a:t>
+              <a:t>10-Dec-20</a:t>
             </a:fld>
             <a:endParaRPr lang="en-US"/>
           </a:p>
@@ -1007,7 +1007,7 @@
           <a:p>
             <a:fld id="{B0B69CF3-5B14-48D7-B161-C10A5429FF4B}" type="datetimeFigureOut">
               <a:rPr lang="en-US" smtClean="0"/>
-              <a:t>20/12/08</a:t>
+              <a:t>10-Dec-20</a:t>
             </a:fld>
             <a:endParaRPr lang="en-US"/>
           </a:p>
@@ -1239,7 +1239,7 @@
           <a:p>
             <a:fld id="{B0B69CF3-5B14-48D7-B161-C10A5429FF4B}" type="datetimeFigureOut">
               <a:rPr lang="en-US" smtClean="0"/>
-              <a:t>20/12/08</a:t>
+              <a:t>10-Dec-20</a:t>
             </a:fld>
             <a:endParaRPr lang="en-US"/>
           </a:p>
@@ -1606,7 +1606,7 @@
           <a:p>
             <a:fld id="{B0B69CF3-5B14-48D7-B161-C10A5429FF4B}" type="datetimeFigureOut">
               <a:rPr lang="en-US" smtClean="0"/>
-              <a:t>20/12/08</a:t>
+              <a:t>10-Dec-20</a:t>
             </a:fld>
             <a:endParaRPr lang="en-US"/>
           </a:p>
@@ -1724,7 +1724,7 @@
           <a:p>
             <a:fld id="{B0B69CF3-5B14-48D7-B161-C10A5429FF4B}" type="datetimeFigureOut">
               <a:rPr lang="en-US" smtClean="0"/>
-              <a:t>20/12/08</a:t>
+              <a:t>10-Dec-20</a:t>
             </a:fld>
             <a:endParaRPr lang="en-US"/>
           </a:p>
@@ -1819,7 +1819,7 @@
           <a:p>
             <a:fld id="{B0B69CF3-5B14-48D7-B161-C10A5429FF4B}" type="datetimeFigureOut">
               <a:rPr lang="en-US" smtClean="0"/>
-              <a:t>20/12/08</a:t>
+              <a:t>10-Dec-20</a:t>
             </a:fld>
             <a:endParaRPr lang="en-US"/>
           </a:p>
@@ -2096,7 +2096,7 @@
           <a:p>
             <a:fld id="{B0B69CF3-5B14-48D7-B161-C10A5429FF4B}" type="datetimeFigureOut">
               <a:rPr lang="en-US" smtClean="0"/>
-              <a:t>20/12/08</a:t>
+              <a:t>10-Dec-20</a:t>
             </a:fld>
             <a:endParaRPr lang="en-US"/>
           </a:p>
@@ -2353,7 +2353,7 @@
           <a:p>
             <a:fld id="{B0B69CF3-5B14-48D7-B161-C10A5429FF4B}" type="datetimeFigureOut">
               <a:rPr lang="en-US" smtClean="0"/>
-              <a:t>20/12/08</a:t>
+              <a:t>10-Dec-20</a:t>
             </a:fld>
             <a:endParaRPr lang="en-US"/>
           </a:p>
@@ -2566,7 +2566,7 @@
           <a:p>
             <a:fld id="{B0B69CF3-5B14-48D7-B161-C10A5429FF4B}" type="datetimeFigureOut">
               <a:rPr lang="en-US" smtClean="0"/>
-              <a:t>20/12/08</a:t>
+              <a:t>10-Dec-20</a:t>
             </a:fld>
             <a:endParaRPr lang="en-US"/>
           </a:p>
@@ -2957,6 +2957,14 @@
 <file path=ppt/slides/slide1.xml><?xml version="1.0" encoding="utf-8"?>
 <p:sld xmlns:a="http://schemas.openxmlformats.org/drawingml/2006/main" xmlns:r="http://schemas.openxmlformats.org/officeDocument/2006/relationships" xmlns:p="http://schemas.openxmlformats.org/presentationml/2006/main">
   <p:cSld>
+    <p:bg>
+      <p:bgPr>
+        <a:solidFill>
+          <a:srgbClr val="F8F9FA"/>
+        </a:solidFill>
+        <a:effectLst/>
+      </p:bgPr>
+    </p:bg>
     <p:spTree>
       <p:nvGrpSpPr>
         <p:cNvPr id="1" name=""/>
@@ -2985,7 +2993,7 @@
         </p:nvSpPr>
         <p:spPr>
           <a:xfrm>
-            <a:off x="6453725" y="1921832"/>
+            <a:off x="4491105" y="2345576"/>
             <a:ext cx="3173736" cy="1888739"/>
           </a:xfrm>
           <a:prstGeom prst="flowChartDecision">
@@ -3059,7 +3067,7 @@
         </p:nvSpPr>
         <p:spPr>
           <a:xfrm>
-            <a:off x="10478131" y="3498791"/>
+            <a:off x="8515511" y="3922535"/>
             <a:ext cx="3173736" cy="1888739"/>
           </a:xfrm>
           <a:prstGeom prst="flowChartDecision">
@@ -3133,7 +3141,7 @@
         </p:nvSpPr>
         <p:spPr>
           <a:xfrm>
-            <a:off x="6453725" y="4771483"/>
+            <a:off x="4491105" y="5195227"/>
             <a:ext cx="3173736" cy="1888739"/>
           </a:xfrm>
           <a:prstGeom prst="flowChartDecision">
@@ -3207,7 +3215,7 @@
         </p:nvSpPr>
         <p:spPr>
           <a:xfrm>
-            <a:off x="6453725" y="7621134"/>
+            <a:off x="4491105" y="8044878"/>
             <a:ext cx="3173736" cy="1888739"/>
           </a:xfrm>
           <a:prstGeom prst="flowChartDecision">
@@ -3303,7 +3311,7 @@
         </p:nvSpPr>
         <p:spPr>
           <a:xfrm>
-            <a:off x="6453725" y="10470785"/>
+            <a:off x="4491105" y="10894529"/>
             <a:ext cx="3173736" cy="1888739"/>
           </a:xfrm>
           <a:prstGeom prst="flowChartDecision">
@@ -3388,8 +3396,8 @@
         </p:nvSpPr>
         <p:spPr>
           <a:xfrm>
-            <a:off x="9947785" y="13320435"/>
-            <a:ext cx="2267339" cy="900758"/>
+            <a:off x="7985165" y="13744179"/>
+            <a:ext cx="2267339" cy="1064640"/>
           </a:xfrm>
           <a:prstGeom prst="rect">
             <a:avLst/>
@@ -3449,8 +3457,8 @@
         </p:nvSpPr>
         <p:spPr>
           <a:xfrm>
-            <a:off x="6876661" y="13320436"/>
-            <a:ext cx="2267339" cy="900758"/>
+            <a:off x="4914041" y="13744179"/>
+            <a:ext cx="2267339" cy="1064639"/>
           </a:xfrm>
           <a:prstGeom prst="rect">
             <a:avLst/>
@@ -3510,8 +3518,8 @@
         </p:nvSpPr>
         <p:spPr>
           <a:xfrm>
-            <a:off x="13018909" y="13320435"/>
-            <a:ext cx="2267339" cy="900758"/>
+            <a:off x="11056289" y="13744178"/>
+            <a:ext cx="2267339" cy="1064641"/>
           </a:xfrm>
           <a:prstGeom prst="rect">
             <a:avLst/>
@@ -3552,7 +3560,7 @@
                   <a:schemeClr val="tx1"/>
                 </a:solidFill>
               </a:rPr>
-              <a:t>Direct</a:t>
+              <a:t>Direct or Partial</a:t>
             </a:r>
           </a:p>
         </p:txBody>
@@ -3575,8 +3583,8 @@
         </p:nvCxnSpPr>
         <p:spPr>
           <a:xfrm>
-            <a:off x="9627461" y="5715853"/>
-            <a:ext cx="4525118" cy="7604582"/>
+            <a:off x="7664841" y="6139597"/>
+            <a:ext cx="4525118" cy="7604581"/>
           </a:xfrm>
           <a:prstGeom prst="bentConnector2">
             <a:avLst/>
@@ -3621,7 +3629,7 @@
         </p:nvCxnSpPr>
         <p:spPr>
           <a:xfrm>
-            <a:off x="9627461" y="2866202"/>
+            <a:off x="7664841" y="3289946"/>
             <a:ext cx="2437538" cy="632589"/>
           </a:xfrm>
           <a:prstGeom prst="bentConnector2">
@@ -3667,7 +3675,7 @@
         </p:nvCxnSpPr>
         <p:spPr>
           <a:xfrm>
-            <a:off x="8040593" y="3810571"/>
+            <a:off x="6077973" y="4234315"/>
             <a:ext cx="0" cy="960912"/>
           </a:xfrm>
           <a:prstGeom prst="straightConnector1">
@@ -3713,7 +3721,7 @@
         </p:nvCxnSpPr>
         <p:spPr>
           <a:xfrm>
-            <a:off x="8040593" y="6660222"/>
+            <a:off x="6077973" y="7083966"/>
             <a:ext cx="0" cy="960912"/>
           </a:xfrm>
           <a:prstGeom prst="straightConnector1">
@@ -3759,7 +3767,7 @@
         </p:nvCxnSpPr>
         <p:spPr>
           <a:xfrm>
-            <a:off x="8040593" y="9509873"/>
+            <a:off x="6077973" y="9933617"/>
             <a:ext cx="0" cy="960912"/>
           </a:xfrm>
           <a:prstGeom prst="straightConnector1">
@@ -3805,8 +3813,8 @@
         </p:nvCxnSpPr>
         <p:spPr>
           <a:xfrm flipH="1">
-            <a:off x="8010331" y="12359524"/>
-            <a:ext cx="30262" cy="960912"/>
+            <a:off x="6047711" y="12783268"/>
+            <a:ext cx="30262" cy="960911"/>
           </a:xfrm>
           <a:prstGeom prst="straightConnector1">
             <a:avLst/>
@@ -3851,8 +3859,8 @@
         </p:nvCxnSpPr>
         <p:spPr>
           <a:xfrm>
-            <a:off x="13651867" y="4443161"/>
-            <a:ext cx="500712" cy="8877274"/>
+            <a:off x="11689247" y="4866905"/>
+            <a:ext cx="500712" cy="8877273"/>
           </a:xfrm>
           <a:prstGeom prst="bentConnector2">
             <a:avLst/>
@@ -3897,7 +3905,7 @@
         </p:nvCxnSpPr>
         <p:spPr>
           <a:xfrm>
-            <a:off x="9627461" y="8565504"/>
+            <a:off x="7664841" y="8989248"/>
             <a:ext cx="1453994" cy="4754931"/>
           </a:xfrm>
           <a:prstGeom prst="bentConnector2">
@@ -3943,7 +3951,7 @@
         </p:nvCxnSpPr>
         <p:spPr>
           <a:xfrm>
-            <a:off x="9627461" y="11415155"/>
+            <a:off x="7664841" y="11838899"/>
             <a:ext cx="1453994" cy="1905280"/>
           </a:xfrm>
           <a:prstGeom prst="bentConnector2">
@@ -3988,7 +3996,7 @@
         </p:nvCxnSpPr>
         <p:spPr>
           <a:xfrm rot="5400000">
-            <a:off x="7737471" y="5690654"/>
+            <a:off x="5774851" y="6114398"/>
             <a:ext cx="4630653" cy="4024404"/>
           </a:xfrm>
           <a:prstGeom prst="bentConnector3">
@@ -4032,7 +4040,7 @@
         </p:nvSpPr>
         <p:spPr>
           <a:xfrm>
-            <a:off x="8040593" y="3889162"/>
+            <a:off x="6077973" y="4312906"/>
             <a:ext cx="609600" cy="369332"/>
           </a:xfrm>
           <a:prstGeom prst="rect">
@@ -4067,7 +4075,7 @@
         </p:nvSpPr>
         <p:spPr>
           <a:xfrm>
-            <a:off x="8149492" y="6660222"/>
+            <a:off x="6186872" y="7083966"/>
             <a:ext cx="609600" cy="369332"/>
           </a:xfrm>
           <a:prstGeom prst="rect">
@@ -4102,7 +4110,7 @@
         </p:nvSpPr>
         <p:spPr>
           <a:xfrm>
-            <a:off x="8157991" y="9464186"/>
+            <a:off x="6195371" y="9887930"/>
             <a:ext cx="609600" cy="369332"/>
           </a:xfrm>
           <a:prstGeom prst="rect">
@@ -4137,7 +4145,7 @@
         </p:nvSpPr>
         <p:spPr>
           <a:xfrm>
-            <a:off x="8134641" y="12359524"/>
+            <a:off x="6172021" y="12783268"/>
             <a:ext cx="609600" cy="369332"/>
           </a:xfrm>
           <a:prstGeom prst="rect">
@@ -4172,7 +4180,7 @@
         </p:nvSpPr>
         <p:spPr>
           <a:xfrm>
-            <a:off x="12191597" y="5284729"/>
+            <a:off x="10228977" y="5708473"/>
             <a:ext cx="609600" cy="369332"/>
           </a:xfrm>
           <a:prstGeom prst="rect">
@@ -4207,7 +4215,7 @@
         </p:nvSpPr>
         <p:spPr>
           <a:xfrm>
-            <a:off x="9552052" y="5315625"/>
+            <a:off x="7589432" y="5739369"/>
             <a:ext cx="609600" cy="369332"/>
           </a:xfrm>
           <a:prstGeom prst="rect">
@@ -4242,7 +4250,7 @@
         </p:nvSpPr>
         <p:spPr>
           <a:xfrm>
-            <a:off x="9627461" y="2456622"/>
+            <a:off x="7664841" y="2880366"/>
             <a:ext cx="609600" cy="369332"/>
           </a:xfrm>
           <a:prstGeom prst="rect">
@@ -4277,7 +4285,7 @@
         </p:nvSpPr>
         <p:spPr>
           <a:xfrm>
-            <a:off x="13663546" y="4042933"/>
+            <a:off x="11700926" y="4466677"/>
             <a:ext cx="609600" cy="369332"/>
           </a:xfrm>
           <a:prstGeom prst="rect">
@@ -4312,7 +4320,7 @@
         </p:nvSpPr>
         <p:spPr>
           <a:xfrm>
-            <a:off x="9618719" y="8180724"/>
+            <a:off x="7656099" y="8604468"/>
             <a:ext cx="609600" cy="369332"/>
           </a:xfrm>
           <a:prstGeom prst="rect">
@@ -4347,7 +4355,7 @@
         </p:nvSpPr>
         <p:spPr>
           <a:xfrm>
-            <a:off x="9627461" y="11047012"/>
+            <a:off x="7664841" y="11470756"/>
             <a:ext cx="609600" cy="369332"/>
           </a:xfrm>
           <a:prstGeom prst="rect">
@@ -4364,183 +4372,6 @@
             <a:r>
               <a:rPr lang="en-US" dirty="0"/>
               <a:t>NO</a:t>
-            </a:r>
-          </a:p>
-        </p:txBody>
-      </p:sp>
-      <p:sp>
-        <p:nvSpPr>
-          <p:cNvPr id="31" name="Rectangle 30">
-            <a:extLst>
-              <a:ext uri="{FF2B5EF4-FFF2-40B4-BE49-F238E27FC236}">
-                <a16:creationId xmlns:a16="http://schemas.microsoft.com/office/drawing/2014/main" id="{B83BB1A9-994B-4E22-B01A-C3EBEEBC40BD}"/>
-              </a:ext>
-            </a:extLst>
-          </p:cNvPr>
-          <p:cNvSpPr/>
-          <p:nvPr/>
-        </p:nvSpPr>
-        <p:spPr>
-          <a:xfrm>
-            <a:off x="6876660" y="14292563"/>
-            <a:ext cx="2267339" cy="288660"/>
-          </a:xfrm>
-          <a:prstGeom prst="rect">
-            <a:avLst/>
-          </a:prstGeom>
-          <a:solidFill>
-            <a:schemeClr val="bg1"/>
-          </a:solidFill>
-          <a:ln>
-            <a:noFill/>
-          </a:ln>
-        </p:spPr>
-        <p:style>
-          <a:lnRef idx="2">
-            <a:schemeClr val="accent1">
-              <a:shade val="50000"/>
-            </a:schemeClr>
-          </a:lnRef>
-          <a:fillRef idx="1">
-            <a:schemeClr val="accent1"/>
-          </a:fillRef>
-          <a:effectRef idx="0">
-            <a:schemeClr val="accent1"/>
-          </a:effectRef>
-          <a:fontRef idx="minor">
-            <a:schemeClr val="lt1"/>
-          </a:fontRef>
-        </p:style>
-        <p:txBody>
-          <a:bodyPr rtlCol="0" anchor="ctr"/>
-          <a:lstStyle/>
-          <a:p>
-            <a:pPr algn="ctr"/>
-            <a:r>
-              <a:rPr lang="en-US" sz="2400" dirty="0">
-                <a:solidFill>
-                  <a:schemeClr val="tx1"/>
-                </a:solidFill>
-              </a:rPr>
-              <a:t>2 buffers in RAM</a:t>
-            </a:r>
-          </a:p>
-        </p:txBody>
-      </p:sp>
-      <p:sp>
-        <p:nvSpPr>
-          <p:cNvPr id="33" name="Rectangle 32">
-            <a:extLst>
-              <a:ext uri="{FF2B5EF4-FFF2-40B4-BE49-F238E27FC236}">
-                <a16:creationId xmlns:a16="http://schemas.microsoft.com/office/drawing/2014/main" id="{EA6A4019-E872-4CBE-B9CC-BB4E0F63E5DA}"/>
-              </a:ext>
-            </a:extLst>
-          </p:cNvPr>
-          <p:cNvSpPr/>
-          <p:nvPr/>
-        </p:nvSpPr>
-        <p:spPr>
-          <a:xfrm>
-            <a:off x="9947785" y="14324115"/>
-            <a:ext cx="2267339" cy="288660"/>
-          </a:xfrm>
-          <a:prstGeom prst="rect">
-            <a:avLst/>
-          </a:prstGeom>
-          <a:solidFill>
-            <a:schemeClr val="bg1"/>
-          </a:solidFill>
-          <a:ln>
-            <a:noFill/>
-          </a:ln>
-        </p:spPr>
-        <p:style>
-          <a:lnRef idx="2">
-            <a:schemeClr val="accent1">
-              <a:shade val="50000"/>
-            </a:schemeClr>
-          </a:lnRef>
-          <a:fillRef idx="1">
-            <a:schemeClr val="accent1"/>
-          </a:fillRef>
-          <a:effectRef idx="0">
-            <a:schemeClr val="accent1"/>
-          </a:effectRef>
-          <a:fontRef idx="minor">
-            <a:schemeClr val="lt1"/>
-          </a:fontRef>
-        </p:style>
-        <p:txBody>
-          <a:bodyPr rtlCol="0" anchor="ctr"/>
-          <a:lstStyle/>
-          <a:p>
-            <a:pPr algn="ctr"/>
-            <a:r>
-              <a:rPr lang="en-US" sz="2400" dirty="0">
-                <a:solidFill>
-                  <a:schemeClr val="tx1"/>
-                </a:solidFill>
-              </a:rPr>
-              <a:t>1 buffer in RAM</a:t>
-            </a:r>
-          </a:p>
-        </p:txBody>
-      </p:sp>
-      <p:sp>
-        <p:nvSpPr>
-          <p:cNvPr id="34" name="Rectangle 33">
-            <a:extLst>
-              <a:ext uri="{FF2B5EF4-FFF2-40B4-BE49-F238E27FC236}">
-                <a16:creationId xmlns:a16="http://schemas.microsoft.com/office/drawing/2014/main" id="{FA9E4A11-BA94-43E6-B70B-98FD11F65094}"/>
-              </a:ext>
-            </a:extLst>
-          </p:cNvPr>
-          <p:cNvSpPr/>
-          <p:nvPr/>
-        </p:nvSpPr>
-        <p:spPr>
-          <a:xfrm>
-            <a:off x="12965833" y="14324115"/>
-            <a:ext cx="2373491" cy="288660"/>
-          </a:xfrm>
-          <a:prstGeom prst="rect">
-            <a:avLst/>
-          </a:prstGeom>
-          <a:solidFill>
-            <a:schemeClr val="bg1"/>
-          </a:solidFill>
-          <a:ln>
-            <a:noFill/>
-          </a:ln>
-        </p:spPr>
-        <p:style>
-          <a:lnRef idx="2">
-            <a:schemeClr val="accent1">
-              <a:shade val="50000"/>
-            </a:schemeClr>
-          </a:lnRef>
-          <a:fillRef idx="1">
-            <a:schemeClr val="accent1"/>
-          </a:fillRef>
-          <a:effectRef idx="0">
-            <a:schemeClr val="accent1"/>
-          </a:effectRef>
-          <a:fontRef idx="minor">
-            <a:schemeClr val="lt1"/>
-          </a:fontRef>
-        </p:style>
-        <p:txBody>
-          <a:bodyPr rtlCol="0" anchor="ctr"/>
-          <a:lstStyle/>
-          <a:p>
-            <a:pPr algn="ctr"/>
-            <a:r>
-              <a:rPr lang="en-US" sz="2400" dirty="0">
-                <a:solidFill>
-                  <a:schemeClr val="tx1"/>
-                </a:solidFill>
-              </a:rPr>
-              <a:t>no buffer in RAM</a:t>
             </a:r>
           </a:p>
         </p:txBody>

</xml_diff>